<commit_message>
Add IDs in the picture
</commit_message>
<xml_diff>
--- a/Wazuh-Attack-Defense-Tree-Converter/Code/Wazuh-ADT-Converter/Input-Files/test-tree/tree.pptx
+++ b/Wazuh-Attack-Defense-Tree-Converter/Code/Wazuh-ADT-Converter/Input-Files/test-tree/tree.pptx
@@ -259,7 +259,7 @@
           <a:p>
             <a:fld id="{46FB4D6B-BD55-42BC-B59A-94D153871167}" type="datetimeFigureOut">
               <a:rPr lang="it-IT" smtClean="0"/>
-              <a:t>02/11/2024</a:t>
+              <a:t>03/11/2024</a:t>
             </a:fld>
             <a:endParaRPr lang="it-IT"/>
           </a:p>
@@ -457,7 +457,7 @@
           <a:p>
             <a:fld id="{46FB4D6B-BD55-42BC-B59A-94D153871167}" type="datetimeFigureOut">
               <a:rPr lang="it-IT" smtClean="0"/>
-              <a:t>02/11/2024</a:t>
+              <a:t>03/11/2024</a:t>
             </a:fld>
             <a:endParaRPr lang="it-IT"/>
           </a:p>
@@ -665,7 +665,7 @@
           <a:p>
             <a:fld id="{46FB4D6B-BD55-42BC-B59A-94D153871167}" type="datetimeFigureOut">
               <a:rPr lang="it-IT" smtClean="0"/>
-              <a:t>02/11/2024</a:t>
+              <a:t>03/11/2024</a:t>
             </a:fld>
             <a:endParaRPr lang="it-IT"/>
           </a:p>
@@ -863,7 +863,7 @@
           <a:p>
             <a:fld id="{46FB4D6B-BD55-42BC-B59A-94D153871167}" type="datetimeFigureOut">
               <a:rPr lang="it-IT" smtClean="0"/>
-              <a:t>02/11/2024</a:t>
+              <a:t>03/11/2024</a:t>
             </a:fld>
             <a:endParaRPr lang="it-IT"/>
           </a:p>
@@ -1138,7 +1138,7 @@
           <a:p>
             <a:fld id="{46FB4D6B-BD55-42BC-B59A-94D153871167}" type="datetimeFigureOut">
               <a:rPr lang="it-IT" smtClean="0"/>
-              <a:t>02/11/2024</a:t>
+              <a:t>03/11/2024</a:t>
             </a:fld>
             <a:endParaRPr lang="it-IT"/>
           </a:p>
@@ -1403,7 +1403,7 @@
           <a:p>
             <a:fld id="{46FB4D6B-BD55-42BC-B59A-94D153871167}" type="datetimeFigureOut">
               <a:rPr lang="it-IT" smtClean="0"/>
-              <a:t>02/11/2024</a:t>
+              <a:t>03/11/2024</a:t>
             </a:fld>
             <a:endParaRPr lang="it-IT"/>
           </a:p>
@@ -1815,7 +1815,7 @@
           <a:p>
             <a:fld id="{46FB4D6B-BD55-42BC-B59A-94D153871167}" type="datetimeFigureOut">
               <a:rPr lang="it-IT" smtClean="0"/>
-              <a:t>02/11/2024</a:t>
+              <a:t>03/11/2024</a:t>
             </a:fld>
             <a:endParaRPr lang="it-IT"/>
           </a:p>
@@ -1956,7 +1956,7 @@
           <a:p>
             <a:fld id="{46FB4D6B-BD55-42BC-B59A-94D153871167}" type="datetimeFigureOut">
               <a:rPr lang="it-IT" smtClean="0"/>
-              <a:t>02/11/2024</a:t>
+              <a:t>03/11/2024</a:t>
             </a:fld>
             <a:endParaRPr lang="it-IT"/>
           </a:p>
@@ -2069,7 +2069,7 @@
           <a:p>
             <a:fld id="{46FB4D6B-BD55-42BC-B59A-94D153871167}" type="datetimeFigureOut">
               <a:rPr lang="it-IT" smtClean="0"/>
-              <a:t>02/11/2024</a:t>
+              <a:t>03/11/2024</a:t>
             </a:fld>
             <a:endParaRPr lang="it-IT"/>
           </a:p>
@@ -2380,7 +2380,7 @@
           <a:p>
             <a:fld id="{46FB4D6B-BD55-42BC-B59A-94D153871167}" type="datetimeFigureOut">
               <a:rPr lang="it-IT" smtClean="0"/>
-              <a:t>02/11/2024</a:t>
+              <a:t>03/11/2024</a:t>
             </a:fld>
             <a:endParaRPr lang="it-IT"/>
           </a:p>
@@ -2668,7 +2668,7 @@
           <a:p>
             <a:fld id="{46FB4D6B-BD55-42BC-B59A-94D153871167}" type="datetimeFigureOut">
               <a:rPr lang="it-IT" smtClean="0"/>
-              <a:t>02/11/2024</a:t>
+              <a:t>03/11/2024</a:t>
             </a:fld>
             <a:endParaRPr lang="it-IT"/>
           </a:p>
@@ -2909,7 +2909,7 @@
           <a:p>
             <a:fld id="{46FB4D6B-BD55-42BC-B59A-94D153871167}" type="datetimeFigureOut">
               <a:rPr lang="it-IT" smtClean="0"/>
-              <a:t>02/11/2024</a:t>
+              <a:t>03/11/2024</a:t>
             </a:fld>
             <a:endParaRPr lang="it-IT"/>
           </a:p>
@@ -5225,6 +5225,431 @@
               <a:rPr lang="it-IT" sz="1400" dirty="0"/>
               <a:t> def4</a:t>
             </a:r>
+          </a:p>
+        </p:txBody>
+      </p:sp>
+      <p:sp>
+        <p:nvSpPr>
+          <p:cNvPr id="13" name="TextBox 12">
+            <a:extLst>
+              <a:ext uri="{FF2B5EF4-FFF2-40B4-BE49-F238E27FC236}">
+                <a16:creationId xmlns:a16="http://schemas.microsoft.com/office/drawing/2014/main" id="{A0B9DD11-1D5C-5AA3-9229-317151EC02BE}"/>
+              </a:ext>
+            </a:extLst>
+          </p:cNvPr>
+          <p:cNvSpPr txBox="1"/>
+          <p:nvPr/>
+        </p:nvSpPr>
+        <p:spPr>
+          <a:xfrm>
+            <a:off x="4961636" y="284205"/>
+            <a:ext cx="493871" cy="261610"/>
+          </a:xfrm>
+          <a:prstGeom prst="rect">
+            <a:avLst/>
+          </a:prstGeom>
+          <a:noFill/>
+        </p:spPr>
+        <p:txBody>
+          <a:bodyPr wrap="square" rtlCol="0">
+            <a:spAutoFit/>
+          </a:bodyPr>
+          <a:lstStyle/>
+          <a:p>
+            <a:r>
+              <a:rPr lang="it-IT" sz="1100" dirty="0"/>
+              <a:t>Id: 0</a:t>
+            </a:r>
+          </a:p>
+        </p:txBody>
+      </p:sp>
+      <p:sp>
+        <p:nvSpPr>
+          <p:cNvPr id="15" name="TextBox 14">
+            <a:extLst>
+              <a:ext uri="{FF2B5EF4-FFF2-40B4-BE49-F238E27FC236}">
+                <a16:creationId xmlns:a16="http://schemas.microsoft.com/office/drawing/2014/main" id="{A86D9397-A96E-93AF-DCD6-9BB3872FC2CC}"/>
+              </a:ext>
+            </a:extLst>
+          </p:cNvPr>
+          <p:cNvSpPr txBox="1"/>
+          <p:nvPr/>
+        </p:nvSpPr>
+        <p:spPr>
+          <a:xfrm>
+            <a:off x="2574232" y="1902644"/>
+            <a:ext cx="493871" cy="261610"/>
+          </a:xfrm>
+          <a:prstGeom prst="rect">
+            <a:avLst/>
+          </a:prstGeom>
+          <a:noFill/>
+        </p:spPr>
+        <p:txBody>
+          <a:bodyPr wrap="square" rtlCol="0">
+            <a:spAutoFit/>
+          </a:bodyPr>
+          <a:lstStyle/>
+          <a:p>
+            <a:r>
+              <a:rPr lang="it-IT" sz="1100" dirty="0"/>
+              <a:t>Id: 1</a:t>
+            </a:r>
+          </a:p>
+        </p:txBody>
+      </p:sp>
+      <p:sp>
+        <p:nvSpPr>
+          <p:cNvPr id="16" name="TextBox 15">
+            <a:extLst>
+              <a:ext uri="{FF2B5EF4-FFF2-40B4-BE49-F238E27FC236}">
+                <a16:creationId xmlns:a16="http://schemas.microsoft.com/office/drawing/2014/main" id="{AAE144E9-AB99-B178-D2E6-A6BAEB497094}"/>
+              </a:ext>
+            </a:extLst>
+          </p:cNvPr>
+          <p:cNvSpPr txBox="1"/>
+          <p:nvPr/>
+        </p:nvSpPr>
+        <p:spPr>
+          <a:xfrm>
+            <a:off x="4057196" y="1875634"/>
+            <a:ext cx="493871" cy="261610"/>
+          </a:xfrm>
+          <a:prstGeom prst="rect">
+            <a:avLst/>
+          </a:prstGeom>
+          <a:noFill/>
+        </p:spPr>
+        <p:txBody>
+          <a:bodyPr wrap="square" rtlCol="0">
+            <a:spAutoFit/>
+          </a:bodyPr>
+          <a:lstStyle/>
+          <a:p>
+            <a:r>
+              <a:rPr lang="it-IT" sz="1100" dirty="0"/>
+              <a:t>Id: 2</a:t>
+            </a:r>
+          </a:p>
+        </p:txBody>
+      </p:sp>
+      <p:sp>
+        <p:nvSpPr>
+          <p:cNvPr id="18" name="TextBox 17">
+            <a:extLst>
+              <a:ext uri="{FF2B5EF4-FFF2-40B4-BE49-F238E27FC236}">
+                <a16:creationId xmlns:a16="http://schemas.microsoft.com/office/drawing/2014/main" id="{84BBC521-AB4D-F46D-7F29-1B522455CEE0}"/>
+              </a:ext>
+            </a:extLst>
+          </p:cNvPr>
+          <p:cNvSpPr txBox="1"/>
+          <p:nvPr/>
+        </p:nvSpPr>
+        <p:spPr>
+          <a:xfrm>
+            <a:off x="6892200" y="1872659"/>
+            <a:ext cx="493871" cy="261610"/>
+          </a:xfrm>
+          <a:prstGeom prst="rect">
+            <a:avLst/>
+          </a:prstGeom>
+          <a:noFill/>
+        </p:spPr>
+        <p:txBody>
+          <a:bodyPr wrap="square" rtlCol="0">
+            <a:spAutoFit/>
+          </a:bodyPr>
+          <a:lstStyle/>
+          <a:p>
+            <a:r>
+              <a:rPr lang="it-IT" sz="1100" dirty="0"/>
+              <a:t>Id: 3</a:t>
+            </a:r>
+          </a:p>
+        </p:txBody>
+      </p:sp>
+      <p:sp>
+        <p:nvSpPr>
+          <p:cNvPr id="19" name="TextBox 18">
+            <a:extLst>
+              <a:ext uri="{FF2B5EF4-FFF2-40B4-BE49-F238E27FC236}">
+                <a16:creationId xmlns:a16="http://schemas.microsoft.com/office/drawing/2014/main" id="{F5DF4E90-C334-3AAE-8C07-D08536BC3DD7}"/>
+              </a:ext>
+            </a:extLst>
+          </p:cNvPr>
+          <p:cNvSpPr txBox="1"/>
+          <p:nvPr/>
+        </p:nvSpPr>
+        <p:spPr>
+          <a:xfrm>
+            <a:off x="9672053" y="1876661"/>
+            <a:ext cx="493871" cy="261610"/>
+          </a:xfrm>
+          <a:prstGeom prst="rect">
+            <a:avLst/>
+          </a:prstGeom>
+          <a:noFill/>
+        </p:spPr>
+        <p:txBody>
+          <a:bodyPr wrap="square" rtlCol="0">
+            <a:spAutoFit/>
+          </a:bodyPr>
+          <a:lstStyle/>
+          <a:p>
+            <a:r>
+              <a:rPr lang="it-IT" sz="1100" dirty="0"/>
+              <a:t>Id: 4</a:t>
+            </a:r>
+          </a:p>
+        </p:txBody>
+      </p:sp>
+      <p:sp>
+        <p:nvSpPr>
+          <p:cNvPr id="21" name="TextBox 20">
+            <a:extLst>
+              <a:ext uri="{FF2B5EF4-FFF2-40B4-BE49-F238E27FC236}">
+                <a16:creationId xmlns:a16="http://schemas.microsoft.com/office/drawing/2014/main" id="{E6399A01-C98C-83A0-13F1-FDCD622FB011}"/>
+              </a:ext>
+            </a:extLst>
+          </p:cNvPr>
+          <p:cNvSpPr txBox="1"/>
+          <p:nvPr/>
+        </p:nvSpPr>
+        <p:spPr>
+          <a:xfrm>
+            <a:off x="1396518" y="3635603"/>
+            <a:ext cx="493871" cy="261610"/>
+          </a:xfrm>
+          <a:prstGeom prst="rect">
+            <a:avLst/>
+          </a:prstGeom>
+          <a:noFill/>
+        </p:spPr>
+        <p:txBody>
+          <a:bodyPr wrap="square" rtlCol="0">
+            <a:spAutoFit/>
+          </a:bodyPr>
+          <a:lstStyle/>
+          <a:p>
+            <a:r>
+              <a:rPr lang="it-IT" sz="1100" dirty="0"/>
+              <a:t>Id: 5</a:t>
+            </a:r>
+          </a:p>
+        </p:txBody>
+      </p:sp>
+      <p:sp>
+        <p:nvSpPr>
+          <p:cNvPr id="22" name="TextBox 21">
+            <a:extLst>
+              <a:ext uri="{FF2B5EF4-FFF2-40B4-BE49-F238E27FC236}">
+                <a16:creationId xmlns:a16="http://schemas.microsoft.com/office/drawing/2014/main" id="{D7F96E2E-E54B-DF0F-7BCF-6FFC2555FDC5}"/>
+              </a:ext>
+            </a:extLst>
+          </p:cNvPr>
+          <p:cNvSpPr txBox="1"/>
+          <p:nvPr/>
+        </p:nvSpPr>
+        <p:spPr>
+          <a:xfrm>
+            <a:off x="3380152" y="3618581"/>
+            <a:ext cx="493871" cy="261610"/>
+          </a:xfrm>
+          <a:prstGeom prst="rect">
+            <a:avLst/>
+          </a:prstGeom>
+          <a:noFill/>
+        </p:spPr>
+        <p:txBody>
+          <a:bodyPr wrap="square" rtlCol="0">
+            <a:spAutoFit/>
+          </a:bodyPr>
+          <a:lstStyle/>
+          <a:p>
+            <a:r>
+              <a:rPr lang="it-IT" sz="1100" dirty="0"/>
+              <a:t>Id: 6</a:t>
+            </a:r>
+          </a:p>
+        </p:txBody>
+      </p:sp>
+      <p:sp>
+        <p:nvSpPr>
+          <p:cNvPr id="24" name="TextBox 23">
+            <a:extLst>
+              <a:ext uri="{FF2B5EF4-FFF2-40B4-BE49-F238E27FC236}">
+                <a16:creationId xmlns:a16="http://schemas.microsoft.com/office/drawing/2014/main" id="{D061C767-6F92-4C16-F1AD-5BE3C47519BB}"/>
+              </a:ext>
+            </a:extLst>
+          </p:cNvPr>
+          <p:cNvSpPr txBox="1"/>
+          <p:nvPr/>
+        </p:nvSpPr>
+        <p:spPr>
+          <a:xfrm>
+            <a:off x="9801949" y="3058684"/>
+            <a:ext cx="493871" cy="261610"/>
+          </a:xfrm>
+          <a:prstGeom prst="rect">
+            <a:avLst/>
+          </a:prstGeom>
+          <a:noFill/>
+        </p:spPr>
+        <p:txBody>
+          <a:bodyPr wrap="square" rtlCol="0">
+            <a:spAutoFit/>
+          </a:bodyPr>
+          <a:lstStyle/>
+          <a:p>
+            <a:r>
+              <a:rPr lang="it-IT" sz="1100" dirty="0"/>
+              <a:t>Id: 7</a:t>
+            </a:r>
+          </a:p>
+        </p:txBody>
+      </p:sp>
+      <p:sp>
+        <p:nvSpPr>
+          <p:cNvPr id="26" name="TextBox 25">
+            <a:extLst>
+              <a:ext uri="{FF2B5EF4-FFF2-40B4-BE49-F238E27FC236}">
+                <a16:creationId xmlns:a16="http://schemas.microsoft.com/office/drawing/2014/main" id="{C9DDBCF8-E8F9-A08E-34D4-EAF90BF0D16E}"/>
+              </a:ext>
+            </a:extLst>
+          </p:cNvPr>
+          <p:cNvSpPr txBox="1"/>
+          <p:nvPr/>
+        </p:nvSpPr>
+        <p:spPr>
+          <a:xfrm>
+            <a:off x="837" y="2446707"/>
+            <a:ext cx="493871" cy="261610"/>
+          </a:xfrm>
+          <a:prstGeom prst="rect">
+            <a:avLst/>
+          </a:prstGeom>
+          <a:noFill/>
+        </p:spPr>
+        <p:txBody>
+          <a:bodyPr wrap="square" rtlCol="0">
+            <a:spAutoFit/>
+          </a:bodyPr>
+          <a:lstStyle/>
+          <a:p>
+            <a:r>
+              <a:rPr lang="it-IT" sz="1100" dirty="0"/>
+              <a:t>Id: 1</a:t>
+            </a:r>
+          </a:p>
+        </p:txBody>
+      </p:sp>
+      <p:sp>
+        <p:nvSpPr>
+          <p:cNvPr id="30" name="TextBox 29">
+            <a:extLst>
+              <a:ext uri="{FF2B5EF4-FFF2-40B4-BE49-F238E27FC236}">
+                <a16:creationId xmlns:a16="http://schemas.microsoft.com/office/drawing/2014/main" id="{4FCFF7B2-2C4B-FF38-3C2E-54E94AA28438}"/>
+              </a:ext>
+            </a:extLst>
+          </p:cNvPr>
+          <p:cNvSpPr txBox="1"/>
+          <p:nvPr/>
+        </p:nvSpPr>
+        <p:spPr>
+          <a:xfrm>
+            <a:off x="3761346" y="2694587"/>
+            <a:ext cx="493871" cy="261610"/>
+          </a:xfrm>
+          <a:prstGeom prst="rect">
+            <a:avLst/>
+          </a:prstGeom>
+          <a:noFill/>
+        </p:spPr>
+        <p:txBody>
+          <a:bodyPr wrap="square" rtlCol="0">
+            <a:spAutoFit/>
+          </a:bodyPr>
+          <a:lstStyle/>
+          <a:p>
+            <a:r>
+              <a:rPr lang="it-IT" sz="1100" dirty="0"/>
+              <a:t>Id: 2</a:t>
+            </a:r>
+          </a:p>
+        </p:txBody>
+      </p:sp>
+      <p:sp>
+        <p:nvSpPr>
+          <p:cNvPr id="31" name="TextBox 30">
+            <a:extLst>
+              <a:ext uri="{FF2B5EF4-FFF2-40B4-BE49-F238E27FC236}">
+                <a16:creationId xmlns:a16="http://schemas.microsoft.com/office/drawing/2014/main" id="{0417A90A-27BB-137C-97A8-FE72350D0910}"/>
+              </a:ext>
+            </a:extLst>
+          </p:cNvPr>
+          <p:cNvSpPr txBox="1"/>
+          <p:nvPr/>
+        </p:nvSpPr>
+        <p:spPr>
+          <a:xfrm>
+            <a:off x="6721223" y="2694587"/>
+            <a:ext cx="493871" cy="261610"/>
+          </a:xfrm>
+          <a:prstGeom prst="rect">
+            <a:avLst/>
+          </a:prstGeom>
+          <a:noFill/>
+        </p:spPr>
+        <p:txBody>
+          <a:bodyPr wrap="square" rtlCol="0">
+            <a:spAutoFit/>
+          </a:bodyPr>
+          <a:lstStyle/>
+          <a:p>
+            <a:r>
+              <a:rPr lang="it-IT" sz="1100" dirty="0"/>
+              <a:t>Id: 3</a:t>
+            </a:r>
+          </a:p>
+        </p:txBody>
+      </p:sp>
+      <p:sp>
+        <p:nvSpPr>
+          <p:cNvPr id="33" name="TextBox 32">
+            <a:extLst>
+              <a:ext uri="{FF2B5EF4-FFF2-40B4-BE49-F238E27FC236}">
+                <a16:creationId xmlns:a16="http://schemas.microsoft.com/office/drawing/2014/main" id="{54F32633-DFA9-3617-677C-049E55EE348D}"/>
+              </a:ext>
+            </a:extLst>
+          </p:cNvPr>
+          <p:cNvSpPr txBox="1"/>
+          <p:nvPr/>
+        </p:nvSpPr>
+        <p:spPr>
+          <a:xfrm>
+            <a:off x="1348823" y="4445305"/>
+            <a:ext cx="493871" cy="261610"/>
+          </a:xfrm>
+          <a:prstGeom prst="rect">
+            <a:avLst/>
+          </a:prstGeom>
+          <a:noFill/>
+        </p:spPr>
+        <p:txBody>
+          <a:bodyPr wrap="square" rtlCol="0">
+            <a:spAutoFit/>
+          </a:bodyPr>
+          <a:lstStyle/>
+          <a:p>
+            <a:r>
+              <a:rPr lang="it-IT" sz="1100" dirty="0"/>
+              <a:t>Id</a:t>
+            </a:r>
+            <a:r>
+              <a:rPr lang="it-IT" sz="1100"/>
+              <a:t>: 4</a:t>
+            </a:r>
+            <a:endParaRPr lang="it-IT" sz="1100" dirty="0"/>
           </a:p>
         </p:txBody>
       </p:sp>

</xml_diff>